<commit_message>
Some minor cleanup of use case #1
</commit_message>
<xml_diff>
--- a/use_cases/elegant/simple_fodo/simple_fodo.pptx
+++ b/use_cases/elegant/simple_fodo/simple_fodo.pptx
@@ -105,6 +105,22 @@
       </a:defRPr>
     </a:lvl9pPr>
   </p:defaultTextStyle>
+  <p:extLst>
+    <p:ext uri="{EFAFB233-063F-42B5-8137-9DF3F51BA10A}">
+      <p15:sldGuideLst xmlns:p15="http://schemas.microsoft.com/office/powerpoint/2012/main">
+        <p15:guide id="1" orient="horz" pos="2160">
+          <p15:clr>
+            <a:srgbClr val="A4A3A4"/>
+          </p15:clr>
+        </p15:guide>
+        <p15:guide id="2" pos="2880">
+          <p15:clr>
+            <a:srgbClr val="A4A3A4"/>
+          </p15:clr>
+        </p15:guide>
+      </p15:sldGuideLst>
+    </p:ext>
+  </p:extLst>
 </p:presentation>
 </file>
 
@@ -289,7 +305,7 @@
           <a:p>
             <a:fld id="{DA4FAA51-2059-4E4D-9591-637494CA0B59}" type="datetimeFigureOut">
               <a:rPr lang="en-US" smtClean="0"/>
-              <a:t>3/26/15</a:t>
+              <a:t>3/26/2015</a:t>
             </a:fld>
             <a:endParaRPr lang="en-US"/>
           </a:p>
@@ -459,7 +475,7 @@
           <a:p>
             <a:fld id="{DA4FAA51-2059-4E4D-9591-637494CA0B59}" type="datetimeFigureOut">
               <a:rPr lang="en-US" smtClean="0"/>
-              <a:t>3/26/15</a:t>
+              <a:t>3/26/2015</a:t>
             </a:fld>
             <a:endParaRPr lang="en-US"/>
           </a:p>
@@ -639,7 +655,7 @@
           <a:p>
             <a:fld id="{DA4FAA51-2059-4E4D-9591-637494CA0B59}" type="datetimeFigureOut">
               <a:rPr lang="en-US" smtClean="0"/>
-              <a:t>3/26/15</a:t>
+              <a:t>3/26/2015</a:t>
             </a:fld>
             <a:endParaRPr lang="en-US"/>
           </a:p>
@@ -809,7 +825,7 @@
           <a:p>
             <a:fld id="{DA4FAA51-2059-4E4D-9591-637494CA0B59}" type="datetimeFigureOut">
               <a:rPr lang="en-US" smtClean="0"/>
-              <a:t>3/26/15</a:t>
+              <a:t>3/26/2015</a:t>
             </a:fld>
             <a:endParaRPr lang="en-US"/>
           </a:p>
@@ -1055,7 +1071,7 @@
           <a:p>
             <a:fld id="{DA4FAA51-2059-4E4D-9591-637494CA0B59}" type="datetimeFigureOut">
               <a:rPr lang="en-US" smtClean="0"/>
-              <a:t>3/26/15</a:t>
+              <a:t>3/26/2015</a:t>
             </a:fld>
             <a:endParaRPr lang="en-US"/>
           </a:p>
@@ -1343,7 +1359,7 @@
           <a:p>
             <a:fld id="{DA4FAA51-2059-4E4D-9591-637494CA0B59}" type="datetimeFigureOut">
               <a:rPr lang="en-US" smtClean="0"/>
-              <a:t>3/26/15</a:t>
+              <a:t>3/26/2015</a:t>
             </a:fld>
             <a:endParaRPr lang="en-US"/>
           </a:p>
@@ -1765,7 +1781,7 @@
           <a:p>
             <a:fld id="{DA4FAA51-2059-4E4D-9591-637494CA0B59}" type="datetimeFigureOut">
               <a:rPr lang="en-US" smtClean="0"/>
-              <a:t>3/26/15</a:t>
+              <a:t>3/26/2015</a:t>
             </a:fld>
             <a:endParaRPr lang="en-US"/>
           </a:p>
@@ -1883,7 +1899,7 @@
           <a:p>
             <a:fld id="{DA4FAA51-2059-4E4D-9591-637494CA0B59}" type="datetimeFigureOut">
               <a:rPr lang="en-US" smtClean="0"/>
-              <a:t>3/26/15</a:t>
+              <a:t>3/26/2015</a:t>
             </a:fld>
             <a:endParaRPr lang="en-US"/>
           </a:p>
@@ -1978,7 +1994,7 @@
           <a:p>
             <a:fld id="{DA4FAA51-2059-4E4D-9591-637494CA0B59}" type="datetimeFigureOut">
               <a:rPr lang="en-US" smtClean="0"/>
-              <a:t>3/26/15</a:t>
+              <a:t>3/26/2015</a:t>
             </a:fld>
             <a:endParaRPr lang="en-US"/>
           </a:p>
@@ -2255,7 +2271,7 @@
           <a:p>
             <a:fld id="{DA4FAA51-2059-4E4D-9591-637494CA0B59}" type="datetimeFigureOut">
               <a:rPr lang="en-US" smtClean="0"/>
-              <a:t>3/26/15</a:t>
+              <a:t>3/26/2015</a:t>
             </a:fld>
             <a:endParaRPr lang="en-US"/>
           </a:p>
@@ -2508,7 +2524,7 @@
           <a:p>
             <a:fld id="{DA4FAA51-2059-4E4D-9591-637494CA0B59}" type="datetimeFigureOut">
               <a:rPr lang="en-US" smtClean="0"/>
-              <a:t>3/26/15</a:t>
+              <a:t>3/26/2015</a:t>
             </a:fld>
             <a:endParaRPr lang="en-US"/>
           </a:p>
@@ -2721,7 +2737,7 @@
           <a:p>
             <a:fld id="{DA4FAA51-2059-4E4D-9591-637494CA0B59}" type="datetimeFigureOut">
               <a:rPr lang="en-US" smtClean="0"/>
-              <a:t>3/26/15</a:t>
+              <a:t>3/26/2015</a:t>
             </a:fld>
             <a:endParaRPr lang="en-US"/>
           </a:p>
@@ -3109,7 +3125,7 @@
         <p:spPr>
           <a:xfrm>
             <a:off x="457200" y="12329"/>
-            <a:ext cx="5920649" cy="802210"/>
+            <a:ext cx="8197913" cy="802210"/>
           </a:xfrm>
         </p:spPr>
         <p:txBody>
@@ -3121,7 +3137,11 @@
             <a:pPr algn="l"/>
             <a:r>
               <a:rPr lang="en-US" sz="2800" dirty="0" smtClean="0"/>
-              <a:t>User Activity #1</a:t>
+              <a:t>RadTrack – Elegant Use Case </a:t>
+            </a:r>
+            <a:r>
+              <a:rPr lang="en-US" sz="2800" dirty="0" smtClean="0"/>
+              <a:t>#1</a:t>
             </a:r>
             <a:endParaRPr lang="en-US" sz="2800" dirty="0"/>
           </a:p>
@@ -3933,32 +3953,19 @@
           <a:p>
             <a:r>
               <a:rPr lang="en-US" dirty="0" smtClean="0"/>
-              <a:t>Final beam </a:t>
-            </a:r>
+              <a:t>Final beam distribution</a:t>
+            </a:r>
+          </a:p>
+          <a:p>
             <a:r>
               <a:rPr lang="en-US" dirty="0" smtClean="0"/>
-              <a:t>distribution</a:t>
+              <a:t>and beta function evolution </a:t>
             </a:r>
           </a:p>
           <a:p>
             <a:r>
               <a:rPr lang="en-US" dirty="0" smtClean="0"/>
-              <a:t>and </a:t>
-            </a:r>
-            <a:r>
-              <a:rPr lang="en-US" dirty="0" smtClean="0"/>
-              <a:t>beta function evolution </a:t>
-            </a:r>
-            <a:endParaRPr lang="en-US" dirty="0" smtClean="0"/>
-          </a:p>
-          <a:p>
-            <a:r>
-              <a:rPr lang="en-US" dirty="0" smtClean="0"/>
-              <a:t>through </a:t>
-            </a:r>
-            <a:r>
-              <a:rPr lang="en-US" dirty="0" smtClean="0"/>
-              <a:t>FODO</a:t>
+              <a:t>through FODO</a:t>
             </a:r>
             <a:endParaRPr lang="en-US" dirty="0"/>
           </a:p>
@@ -4133,34 +4140,60 @@
           <a:p>
             <a:r>
               <a:rPr lang="en-US" dirty="0" smtClean="0"/>
-              <a:t>Final beam </a:t>
-            </a:r>
+              <a:t>Final beam distribution</a:t>
+            </a:r>
+          </a:p>
+          <a:p>
             <a:r>
               <a:rPr lang="en-US" dirty="0" smtClean="0"/>
-              <a:t>distribution</a:t>
+              <a:t>and beta function evolution </a:t>
             </a:r>
           </a:p>
           <a:p>
             <a:r>
               <a:rPr lang="en-US" dirty="0" smtClean="0"/>
-              <a:t>and </a:t>
-            </a:r>
-            <a:r>
-              <a:rPr lang="en-US" dirty="0" smtClean="0"/>
-              <a:t>beta function evolution </a:t>
-            </a:r>
-            <a:endParaRPr lang="en-US" dirty="0" smtClean="0"/>
-          </a:p>
-          <a:p>
-            <a:r>
-              <a:rPr lang="en-US" dirty="0" smtClean="0"/>
-              <a:t>Through 10x </a:t>
-            </a:r>
-            <a:r>
-              <a:rPr lang="en-US" dirty="0" smtClean="0"/>
-              <a:t>FODO</a:t>
+              <a:t>Through 10x FODO</a:t>
             </a:r>
             <a:endParaRPr lang="en-US" dirty="0"/>
+          </a:p>
+        </p:txBody>
+      </p:sp>
+      <p:sp>
+        <p:nvSpPr>
+          <p:cNvPr id="11" name="Title 1"/>
+          <p:cNvSpPr>
+            <a:spLocks noGrp="1"/>
+          </p:cNvSpPr>
+          <p:nvPr>
+            <p:ph type="title"/>
+          </p:nvPr>
+        </p:nvSpPr>
+        <p:spPr>
+          <a:xfrm>
+            <a:off x="457200" y="12329"/>
+            <a:ext cx="8197913" cy="802210"/>
+          </a:xfrm>
+        </p:spPr>
+        <p:txBody>
+          <a:bodyPr>
+            <a:normAutofit/>
+          </a:bodyPr>
+          <a:lstStyle/>
+          <a:p>
+            <a:pPr algn="l"/>
+            <a:r>
+              <a:rPr lang="en-US" sz="2800" dirty="0" smtClean="0"/>
+              <a:t>Elegant Use Case </a:t>
+            </a:r>
+            <a:r>
+              <a:rPr lang="en-US" sz="2800" dirty="0" smtClean="0"/>
+              <a:t>#</a:t>
+            </a:r>
+            <a:r>
+              <a:rPr lang="en-US" sz="2800" dirty="0" smtClean="0"/>
+              <a:t>1 – info to verify correct execution</a:t>
+            </a:r>
+            <a:endParaRPr lang="en-US" sz="2800" dirty="0"/>
           </a:p>
         </p:txBody>
       </p:sp>

</xml_diff>

<commit_message>
modified use case description to make it easier
</commit_message>
<xml_diff>
--- a/use_cases/elegant/simple_fodo/simple_fodo.pptx
+++ b/use_cases/elegant/simple_fodo/simple_fodo.pptx
@@ -305,7 +305,7 @@
           <a:p>
             <a:fld id="{DA4FAA51-2059-4E4D-9591-637494CA0B59}" type="datetimeFigureOut">
               <a:rPr lang="en-US" smtClean="0"/>
-              <a:t>4/22/2015</a:t>
+              <a:t>5/1/2015</a:t>
             </a:fld>
             <a:endParaRPr lang="en-US"/>
           </a:p>
@@ -475,7 +475,7 @@
           <a:p>
             <a:fld id="{DA4FAA51-2059-4E4D-9591-637494CA0B59}" type="datetimeFigureOut">
               <a:rPr lang="en-US" smtClean="0"/>
-              <a:t>4/22/2015</a:t>
+              <a:t>5/1/2015</a:t>
             </a:fld>
             <a:endParaRPr lang="en-US"/>
           </a:p>
@@ -655,7 +655,7 @@
           <a:p>
             <a:fld id="{DA4FAA51-2059-4E4D-9591-637494CA0B59}" type="datetimeFigureOut">
               <a:rPr lang="en-US" smtClean="0"/>
-              <a:t>4/22/2015</a:t>
+              <a:t>5/1/2015</a:t>
             </a:fld>
             <a:endParaRPr lang="en-US"/>
           </a:p>
@@ -825,7 +825,7 @@
           <a:p>
             <a:fld id="{DA4FAA51-2059-4E4D-9591-637494CA0B59}" type="datetimeFigureOut">
               <a:rPr lang="en-US" smtClean="0"/>
-              <a:t>4/22/2015</a:t>
+              <a:t>5/1/2015</a:t>
             </a:fld>
             <a:endParaRPr lang="en-US"/>
           </a:p>
@@ -1071,7 +1071,7 @@
           <a:p>
             <a:fld id="{DA4FAA51-2059-4E4D-9591-637494CA0B59}" type="datetimeFigureOut">
               <a:rPr lang="en-US" smtClean="0"/>
-              <a:t>4/22/2015</a:t>
+              <a:t>5/1/2015</a:t>
             </a:fld>
             <a:endParaRPr lang="en-US"/>
           </a:p>
@@ -1359,7 +1359,7 @@
           <a:p>
             <a:fld id="{DA4FAA51-2059-4E4D-9591-637494CA0B59}" type="datetimeFigureOut">
               <a:rPr lang="en-US" smtClean="0"/>
-              <a:t>4/22/2015</a:t>
+              <a:t>5/1/2015</a:t>
             </a:fld>
             <a:endParaRPr lang="en-US"/>
           </a:p>
@@ -1781,7 +1781,7 @@
           <a:p>
             <a:fld id="{DA4FAA51-2059-4E4D-9591-637494CA0B59}" type="datetimeFigureOut">
               <a:rPr lang="en-US" smtClean="0"/>
-              <a:t>4/22/2015</a:t>
+              <a:t>5/1/2015</a:t>
             </a:fld>
             <a:endParaRPr lang="en-US"/>
           </a:p>
@@ -1899,7 +1899,7 @@
           <a:p>
             <a:fld id="{DA4FAA51-2059-4E4D-9591-637494CA0B59}" type="datetimeFigureOut">
               <a:rPr lang="en-US" smtClean="0"/>
-              <a:t>4/22/2015</a:t>
+              <a:t>5/1/2015</a:t>
             </a:fld>
             <a:endParaRPr lang="en-US"/>
           </a:p>
@@ -1994,7 +1994,7 @@
           <a:p>
             <a:fld id="{DA4FAA51-2059-4E4D-9591-637494CA0B59}" type="datetimeFigureOut">
               <a:rPr lang="en-US" smtClean="0"/>
-              <a:t>4/22/2015</a:t>
+              <a:t>5/1/2015</a:t>
             </a:fld>
             <a:endParaRPr lang="en-US"/>
           </a:p>
@@ -2271,7 +2271,7 @@
           <a:p>
             <a:fld id="{DA4FAA51-2059-4E4D-9591-637494CA0B59}" type="datetimeFigureOut">
               <a:rPr lang="en-US" smtClean="0"/>
-              <a:t>4/22/2015</a:t>
+              <a:t>5/1/2015</a:t>
             </a:fld>
             <a:endParaRPr lang="en-US"/>
           </a:p>
@@ -2524,7 +2524,7 @@
           <a:p>
             <a:fld id="{DA4FAA51-2059-4E4D-9591-637494CA0B59}" type="datetimeFigureOut">
               <a:rPr lang="en-US" smtClean="0"/>
-              <a:t>4/22/2015</a:t>
+              <a:t>5/1/2015</a:t>
             </a:fld>
             <a:endParaRPr lang="en-US"/>
           </a:p>
@@ -2737,7 +2737,7 @@
           <a:p>
             <a:fld id="{DA4FAA51-2059-4E4D-9591-637494CA0B59}" type="datetimeFigureOut">
               <a:rPr lang="en-US" smtClean="0"/>
-              <a:t>4/22/2015</a:t>
+              <a:t>5/1/2015</a:t>
             </a:fld>
             <a:endParaRPr lang="en-US"/>
           </a:p>
@@ -3155,7 +3155,7 @@
         </p:nvSpPr>
         <p:spPr>
           <a:xfrm>
-            <a:off x="457200" y="1076848"/>
+            <a:off x="502465" y="778089"/>
             <a:ext cx="8005185" cy="510812"/>
           </a:xfrm>
         </p:spPr>
@@ -3198,7 +3198,7 @@
         </p:blipFill>
         <p:spPr>
           <a:xfrm>
-            <a:off x="5281422" y="1174753"/>
+            <a:off x="5951371" y="821676"/>
             <a:ext cx="2110026" cy="1698880"/>
           </a:xfrm>
           <a:prstGeom prst="rect">
@@ -3214,8 +3214,8 @@
         </p:nvSpPr>
         <p:spPr>
           <a:xfrm>
-            <a:off x="2218099" y="3466571"/>
-            <a:ext cx="5120738" cy="1200329"/>
+            <a:off x="2021598" y="2804783"/>
+            <a:ext cx="6054093" cy="1754326"/>
           </a:xfrm>
           <a:prstGeom prst="rect">
             <a:avLst/>
@@ -3235,25 +3235,58 @@
           </a:p>
           <a:p>
             <a:r>
+              <a:rPr lang="en-US" smtClean="0"/>
+              <a:t>     energy </a:t>
+            </a:r>
+            <a:r>
               <a:rPr lang="en-US" dirty="0" smtClean="0"/>
-              <a:t>Energy = 65 MeV</a:t>
-            </a:r>
-          </a:p>
-          <a:p>
+              <a:t>= 65 MeV</a:t>
+            </a:r>
+          </a:p>
+          <a:p>
+            <a:r>
+              <a:rPr lang="en-US" smtClean="0"/>
+              <a:t>     normalized RMS emittance </a:t>
+            </a:r>
             <a:r>
               <a:rPr lang="en-US" dirty="0" smtClean="0"/>
-              <a:t>Normalized emittance = 2 mm-</a:t>
-            </a:r>
-            <a:r>
-              <a:rPr lang="en-US" dirty="0" err="1" smtClean="0"/>
-              <a:t>mrad</a:t>
+              <a:t>= </a:t>
+            </a:r>
+            <a:r>
+              <a:rPr lang="en-US" smtClean="0"/>
+              <a:t>2 </a:t>
+            </a:r>
+            <a:r>
+              <a:rPr lang="en-US" smtClean="0"/>
+              <a:t>micron</a:t>
             </a:r>
             <a:endParaRPr lang="en-US" dirty="0" smtClean="0"/>
           </a:p>
           <a:p>
             <a:r>
+              <a:rPr lang="en-US" smtClean="0"/>
+              <a:t>     Twiss beta (x,y) = 0.02 m</a:t>
+            </a:r>
+          </a:p>
+          <a:p>
+            <a:endParaRPr lang="en-US" smtClean="0"/>
+          </a:p>
+          <a:p>
+            <a:r>
+              <a:rPr lang="en-US" smtClean="0"/>
+              <a:t>verify that </a:t>
+            </a:r>
+            <a:r>
+              <a:rPr lang="en-US"/>
+              <a:t>t</a:t>
+            </a:r>
+            <a:r>
+              <a:rPr lang="en-US" smtClean="0"/>
+              <a:t>ransverse </a:t>
+            </a:r>
+            <a:r>
               <a:rPr lang="en-US" dirty="0" smtClean="0"/>
-              <a:t>Transverse spot size = 200 µm </a:t>
+              <a:t>spot size = 200 µm </a:t>
             </a:r>
             <a:r>
               <a:rPr lang="en-US" dirty="0" err="1" smtClean="0"/>
@@ -3277,7 +3310,7 @@
         </p:nvSpPr>
         <p:spPr>
           <a:xfrm>
-            <a:off x="457745" y="3010222"/>
+            <a:off x="548274" y="2394609"/>
             <a:ext cx="8005185" cy="510812"/>
           </a:xfrm>
           <a:prstGeom prst="rect">
@@ -3436,11 +3469,7 @@
             </a:r>
             <a:r>
               <a:rPr lang="en-US" sz="2000" smtClean="0"/>
-              <a:t>: </a:t>
-            </a:r>
-            <a:r>
-              <a:rPr lang="en-US" sz="2000" smtClean="0"/>
-              <a:t>  Generate </a:t>
+              <a:t>:   Generate </a:t>
             </a:r>
             <a:r>
               <a:rPr lang="en-US" sz="2000" dirty="0" smtClean="0"/>
@@ -3460,7 +3489,7 @@
         </p:nvSpPr>
         <p:spPr>
           <a:xfrm>
-            <a:off x="534731" y="4791699"/>
+            <a:off x="534731" y="4583480"/>
             <a:ext cx="8005185" cy="510812"/>
           </a:xfrm>
           <a:prstGeom prst="rect">
@@ -3619,11 +3648,7 @@
             </a:r>
             <a:r>
               <a:rPr lang="en-US" sz="2000" smtClean="0"/>
-              <a:t>: </a:t>
-            </a:r>
-            <a:r>
-              <a:rPr lang="en-US" sz="2000" smtClean="0"/>
-              <a:t>  Run </a:t>
+              <a:t>:   Run </a:t>
             </a:r>
             <a:r>
               <a:rPr lang="en-US" sz="2000" dirty="0" smtClean="0"/>
@@ -3641,7 +3666,7 @@
         </p:nvSpPr>
         <p:spPr>
           <a:xfrm>
-            <a:off x="2218099" y="5198000"/>
+            <a:off x="2100410" y="4989781"/>
             <a:ext cx="5857592" cy="646331"/>
           </a:xfrm>
           <a:prstGeom prst="rect">
@@ -3686,7 +3711,7 @@
         </p:nvSpPr>
         <p:spPr>
           <a:xfrm>
-            <a:off x="534731" y="5977338"/>
+            <a:off x="534731" y="5696695"/>
             <a:ext cx="8005185" cy="510812"/>
           </a:xfrm>
           <a:prstGeom prst="rect">
@@ -3845,19 +3870,11 @@
             </a:r>
             <a:r>
               <a:rPr lang="en-US" sz="2000" smtClean="0"/>
-              <a:t>: </a:t>
+              <a:t>:   </a:t>
             </a:r>
             <a:r>
               <a:rPr lang="en-US" sz="2000" smtClean="0"/>
-              <a:t>  </a:t>
-            </a:r>
-            <a:r>
-              <a:rPr lang="en-US" sz="2000" smtClean="0"/>
-              <a:t>Find the matched beam</a:t>
-            </a:r>
-            <a:r>
-              <a:rPr lang="en-US" sz="2000" smtClean="0"/>
-              <a:t> </a:t>
+              <a:t>Create a new beamline, consisting of 10 FODO cells </a:t>
             </a:r>
             <a:endParaRPr lang="en-US" sz="2000" dirty="0"/>
           </a:p>
@@ -3871,7 +3888,7 @@
         </p:nvSpPr>
         <p:spPr>
           <a:xfrm>
-            <a:off x="927112" y="1587660"/>
+            <a:off x="972377" y="1316060"/>
             <a:ext cx="3600885" cy="923330"/>
           </a:xfrm>
           <a:prstGeom prst="rect">
@@ -3886,22 +3903,166 @@
           <a:lstStyle/>
           <a:p>
             <a:r>
+              <a:rPr lang="en-US" smtClean="0"/>
+              <a:t>L = 2.0 m</a:t>
+            </a:r>
+            <a:endParaRPr lang="en-US" dirty="0" smtClean="0"/>
+          </a:p>
+          <a:p>
+            <a:r>
+              <a:rPr lang="en-US" smtClean="0"/>
+              <a:t>Quads:   </a:t>
+            </a:r>
+            <a:r>
+              <a:rPr lang="en-US" smtClean="0">
+                <a:latin typeface="Script MT Bold" panose="03040602040607080904" pitchFamily="66" charset="0"/>
+              </a:rPr>
+              <a:t>l</a:t>
+            </a:r>
+            <a:r>
+              <a:rPr lang="en-US" smtClean="0"/>
+              <a:t> =0.5 m,   k1 = +/- 2 </a:t>
+            </a:r>
+            <a:endParaRPr lang="en-US" dirty="0" smtClean="0"/>
+          </a:p>
+          <a:p>
+            <a:r>
               <a:rPr lang="en-US" dirty="0" smtClean="0"/>
-              <a:t>L=2m</a:t>
-            </a:r>
-          </a:p>
-          <a:p>
-            <a:r>
-              <a:rPr lang="en-US" dirty="0" smtClean="0"/>
-              <a:t>Lengths of quads .5m</a:t>
-            </a:r>
-          </a:p>
-          <a:p>
-            <a:r>
-              <a:rPr lang="en-US" dirty="0" smtClean="0"/>
-              <a:t>Hint: Start from middle of first quad</a:t>
-            </a:r>
-            <a:endParaRPr lang="en-US" dirty="0"/>
+              <a:t>Hint</a:t>
+            </a:r>
+            <a:r>
+              <a:rPr lang="en-US" smtClean="0"/>
+              <a:t>: </a:t>
+            </a:r>
+            <a:r>
+              <a:rPr lang="en-US" smtClean="0"/>
+              <a:t> </a:t>
+            </a:r>
+            <a:r>
+              <a:rPr lang="en-US" smtClean="0">
+                <a:solidFill>
+                  <a:srgbClr val="FF0000"/>
+                </a:solidFill>
+              </a:rPr>
+              <a:t>start </a:t>
+            </a:r>
+            <a:r>
+              <a:rPr lang="en-US" dirty="0" smtClean="0">
+                <a:solidFill>
+                  <a:srgbClr val="FF0000"/>
+                </a:solidFill>
+              </a:rPr>
+              <a:t>from middle of first quad</a:t>
+            </a:r>
+            <a:endParaRPr lang="en-US" dirty="0">
+              <a:solidFill>
+                <a:srgbClr val="FF0000"/>
+              </a:solidFill>
+            </a:endParaRPr>
+          </a:p>
+        </p:txBody>
+      </p:sp>
+      <p:cxnSp>
+        <p:nvCxnSpPr>
+          <p:cNvPr id="5" name="Straight Connector 4"/>
+          <p:cNvCxnSpPr/>
+          <p:nvPr/>
+        </p:nvCxnSpPr>
+        <p:spPr>
+          <a:xfrm>
+            <a:off x="7921788" y="1131684"/>
+            <a:ext cx="18107" cy="923453"/>
+          </a:xfrm>
+          <a:prstGeom prst="line">
+            <a:avLst/>
+          </a:prstGeom>
+          <a:ln w="12700">
+            <a:solidFill>
+              <a:schemeClr val="tx1"/>
+            </a:solidFill>
+          </a:ln>
+        </p:spPr>
+        <p:style>
+          <a:lnRef idx="2">
+            <a:schemeClr val="accent1"/>
+          </a:lnRef>
+          <a:fillRef idx="0">
+            <a:schemeClr val="accent1"/>
+          </a:fillRef>
+          <a:effectRef idx="1">
+            <a:schemeClr val="accent1"/>
+          </a:effectRef>
+          <a:fontRef idx="minor">
+            <a:schemeClr val="tx1"/>
+          </a:fontRef>
+        </p:style>
+      </p:cxnSp>
+      <p:cxnSp>
+        <p:nvCxnSpPr>
+          <p:cNvPr id="14" name="Straight Connector 13"/>
+          <p:cNvCxnSpPr/>
+          <p:nvPr/>
+        </p:nvCxnSpPr>
+        <p:spPr>
+          <a:xfrm>
+            <a:off x="6100529" y="1130183"/>
+            <a:ext cx="18107" cy="923453"/>
+          </a:xfrm>
+          <a:prstGeom prst="line">
+            <a:avLst/>
+          </a:prstGeom>
+          <a:ln w="12700">
+            <a:solidFill>
+              <a:schemeClr val="tx1"/>
+            </a:solidFill>
+          </a:ln>
+        </p:spPr>
+        <p:style>
+          <a:lnRef idx="2">
+            <a:schemeClr val="accent1"/>
+          </a:lnRef>
+          <a:fillRef idx="0">
+            <a:schemeClr val="accent1"/>
+          </a:fillRef>
+          <a:effectRef idx="1">
+            <a:schemeClr val="accent1"/>
+          </a:effectRef>
+          <a:fontRef idx="minor">
+            <a:schemeClr val="tx1"/>
+          </a:fontRef>
+        </p:style>
+      </p:cxnSp>
+      <p:sp>
+        <p:nvSpPr>
+          <p:cNvPr id="15" name="TextBox 14"/>
+          <p:cNvSpPr txBox="1"/>
+          <p:nvPr/>
+        </p:nvSpPr>
+        <p:spPr>
+          <a:xfrm>
+            <a:off x="2089856" y="6047521"/>
+            <a:ext cx="5857592" cy="369332"/>
+          </a:xfrm>
+          <a:prstGeom prst="rect">
+            <a:avLst/>
+          </a:prstGeom>
+          <a:noFill/>
+        </p:spPr>
+        <p:txBody>
+          <a:bodyPr wrap="square" rtlCol="0">
+            <a:spAutoFit/>
+          </a:bodyPr>
+          <a:lstStyle/>
+          <a:p>
+            <a:pPr indent="-182880">
+              <a:buFontTx/>
+              <a:buChar char="-"/>
+            </a:pPr>
+            <a:r>
+              <a:rPr lang="en-US" smtClean="0"/>
+              <a:t>simulate and repeat tasks of Objective 3</a:t>
+            </a:r>
+            <a:endParaRPr lang="en-US" dirty="0" smtClean="0"/>
           </a:p>
         </p:txBody>
       </p:sp>

</xml_diff>